<commit_message>
Editing typos in  result page
</commit_message>
<xml_diff>
--- a/assignment#1/presentation/Predictive_keyboard_team6.pptx
+++ b/assignment#1/presentation/Predictive_keyboard_team6.pptx
@@ -2089,7 +2089,7 @@
           </a:ln>
           <a:extLst>
             <a:ext uri="{C572A759-6A51-4108-AA02-DFA0A04FC94B}">
-              <ma14:wrappingTextBoxFlag xmlns="" xmlns:m="http://schemas.openxmlformats.org/officeDocument/2006/math" xmlns:a14="http://schemas.microsoft.com/office/drawing/2010/main" xmlns:ma14="http://schemas.microsoft.com/office/mac/drawingml/2011/main" val="1"/>
+              <ma14:wrappingTextBoxFlag xmlns:ma14="http://schemas.microsoft.com/office/mac/drawingml/2011/main" xmlns:a14="http://schemas.microsoft.com/office/drawing/2010/main" xmlns:m="http://schemas.openxmlformats.org/officeDocument/2006/math" xmlns="" val="1"/>
             </a:ext>
           </a:extLst>
         </p:spPr>
@@ -2128,7 +2128,7 @@
           </a:ln>
           <a:extLst>
             <a:ext uri="{C572A759-6A51-4108-AA02-DFA0A04FC94B}">
-              <ma14:wrappingTextBoxFlag xmlns="" xmlns:m="http://schemas.openxmlformats.org/officeDocument/2006/math" xmlns:a14="http://schemas.microsoft.com/office/drawing/2010/main" xmlns:ma14="http://schemas.microsoft.com/office/mac/drawingml/2011/main" val="1"/>
+              <ma14:wrappingTextBoxFlag xmlns:ma14="http://schemas.microsoft.com/office/mac/drawingml/2011/main" xmlns:a14="http://schemas.microsoft.com/office/drawing/2010/main" xmlns:m="http://schemas.openxmlformats.org/officeDocument/2006/math" xmlns="" val="1"/>
             </a:ext>
           </a:extLst>
         </p:spPr>
@@ -3087,7 +3087,7 @@
           </a:ln>
           <a:extLst>
             <a:ext uri="{C572A759-6A51-4108-AA02-DFA0A04FC94B}">
-              <ma14:wrappingTextBoxFlag xmlns="" xmlns:m="http://schemas.openxmlformats.org/officeDocument/2006/math" xmlns:a14="http://schemas.microsoft.com/office/drawing/2010/main" xmlns:ma14="http://schemas.microsoft.com/office/mac/drawingml/2011/main" val="1"/>
+              <ma14:wrappingTextBoxFlag xmlns:ma14="http://schemas.microsoft.com/office/mac/drawingml/2011/main" xmlns:a14="http://schemas.microsoft.com/office/drawing/2010/main" xmlns:m="http://schemas.openxmlformats.org/officeDocument/2006/math" xmlns="" val="1"/>
             </a:ext>
           </a:extLst>
         </p:spPr>
@@ -3133,7 +3133,7 @@
           </a:ln>
           <a:extLst>
             <a:ext uri="{C572A759-6A51-4108-AA02-DFA0A04FC94B}">
-              <ma14:wrappingTextBoxFlag xmlns="" xmlns:m="http://schemas.openxmlformats.org/officeDocument/2006/math" xmlns:a14="http://schemas.microsoft.com/office/drawing/2010/main" xmlns:ma14="http://schemas.microsoft.com/office/mac/drawingml/2011/main" val="1"/>
+              <ma14:wrappingTextBoxFlag xmlns:ma14="http://schemas.microsoft.com/office/mac/drawingml/2011/main" xmlns:a14="http://schemas.microsoft.com/office/drawing/2010/main" xmlns:m="http://schemas.openxmlformats.org/officeDocument/2006/math" xmlns="" val="1"/>
             </a:ext>
           </a:extLst>
         </p:spPr>
@@ -3212,7 +3212,7 @@
           </a:ln>
           <a:extLst>
             <a:ext uri="{C572A759-6A51-4108-AA02-DFA0A04FC94B}">
-              <ma14:wrappingTextBoxFlag xmlns="" xmlns:m="http://schemas.openxmlformats.org/officeDocument/2006/math" xmlns:a14="http://schemas.microsoft.com/office/drawing/2010/main" xmlns:ma14="http://schemas.microsoft.com/office/mac/drawingml/2011/main" val="1"/>
+              <ma14:wrappingTextBoxFlag xmlns:ma14="http://schemas.microsoft.com/office/mac/drawingml/2011/main" xmlns:a14="http://schemas.microsoft.com/office/drawing/2010/main" xmlns:m="http://schemas.openxmlformats.org/officeDocument/2006/math" xmlns="" val="1"/>
             </a:ext>
           </a:extLst>
         </p:spPr>
@@ -3279,7 +3279,7 @@
           </a:ln>
           <a:extLst>
             <a:ext uri="{C572A759-6A51-4108-AA02-DFA0A04FC94B}">
-              <ma14:wrappingTextBoxFlag xmlns="" xmlns:m="http://schemas.openxmlformats.org/officeDocument/2006/math" xmlns:a14="http://schemas.microsoft.com/office/drawing/2010/main" xmlns:ma14="http://schemas.microsoft.com/office/mac/drawingml/2011/main" val="1"/>
+              <ma14:wrappingTextBoxFlag xmlns:ma14="http://schemas.microsoft.com/office/mac/drawingml/2011/main" xmlns:a14="http://schemas.microsoft.com/office/drawing/2010/main" xmlns:m="http://schemas.openxmlformats.org/officeDocument/2006/math" xmlns="" val="1"/>
             </a:ext>
           </a:extLst>
         </p:spPr>
@@ -3402,7 +3402,7 @@
           </a:ln>
           <a:extLst>
             <a:ext uri="{C572A759-6A51-4108-AA02-DFA0A04FC94B}">
-              <ma14:wrappingTextBoxFlag xmlns="" xmlns:m="http://schemas.openxmlformats.org/officeDocument/2006/math" xmlns:a14="http://schemas.microsoft.com/office/drawing/2010/main" xmlns:ma14="http://schemas.microsoft.com/office/mac/drawingml/2011/main" val="1"/>
+              <ma14:wrappingTextBoxFlag xmlns:ma14="http://schemas.microsoft.com/office/mac/drawingml/2011/main" xmlns:a14="http://schemas.microsoft.com/office/drawing/2010/main" xmlns:m="http://schemas.openxmlformats.org/officeDocument/2006/math" xmlns="" val="1"/>
             </a:ext>
           </a:extLst>
         </p:spPr>
@@ -3519,7 +3519,7 @@
           </a:ln>
           <a:extLst>
             <a:ext uri="{C572A759-6A51-4108-AA02-DFA0A04FC94B}">
-              <ma14:wrappingTextBoxFlag xmlns="" xmlns:m="http://schemas.openxmlformats.org/officeDocument/2006/math" xmlns:a14="http://schemas.microsoft.com/office/drawing/2010/main" xmlns:ma14="http://schemas.microsoft.com/office/mac/drawingml/2011/main" val="1"/>
+              <ma14:wrappingTextBoxFlag xmlns:ma14="http://schemas.microsoft.com/office/mac/drawingml/2011/main" xmlns:a14="http://schemas.microsoft.com/office/drawing/2010/main" xmlns:m="http://schemas.openxmlformats.org/officeDocument/2006/math" xmlns="" val="1"/>
             </a:ext>
           </a:extLst>
         </p:spPr>
@@ -3627,7 +3627,7 @@
           </a:ln>
           <a:extLst>
             <a:ext uri="{C572A759-6A51-4108-AA02-DFA0A04FC94B}">
-              <ma14:wrappingTextBoxFlag xmlns="" xmlns:m="http://schemas.openxmlformats.org/officeDocument/2006/math" xmlns:a14="http://schemas.microsoft.com/office/drawing/2010/main" xmlns:ma14="http://schemas.microsoft.com/office/mac/drawingml/2011/main" val="1"/>
+              <ma14:wrappingTextBoxFlag xmlns:ma14="http://schemas.microsoft.com/office/mac/drawingml/2011/main" xmlns:a14="http://schemas.microsoft.com/office/drawing/2010/main" xmlns:m="http://schemas.openxmlformats.org/officeDocument/2006/math" xmlns="" val="1"/>
             </a:ext>
           </a:extLst>
         </p:spPr>
@@ -3762,7 +3762,7 @@
           </a:ln>
           <a:extLst>
             <a:ext uri="{C572A759-6A51-4108-AA02-DFA0A04FC94B}">
-              <ma14:wrappingTextBoxFlag xmlns="" xmlns:m="http://schemas.openxmlformats.org/officeDocument/2006/math" xmlns:a14="http://schemas.microsoft.com/office/drawing/2010/main" xmlns:ma14="http://schemas.microsoft.com/office/mac/drawingml/2011/main" val="1"/>
+              <ma14:wrappingTextBoxFlag xmlns:ma14="http://schemas.microsoft.com/office/mac/drawingml/2011/main" xmlns:a14="http://schemas.microsoft.com/office/drawing/2010/main" xmlns:m="http://schemas.openxmlformats.org/officeDocument/2006/math" xmlns="" val="1"/>
             </a:ext>
           </a:extLst>
         </p:spPr>
@@ -3866,7 +3866,7 @@
           </a:ln>
           <a:extLst>
             <a:ext uri="{C572A759-6A51-4108-AA02-DFA0A04FC94B}">
-              <ma14:wrappingTextBoxFlag xmlns="" xmlns:m="http://schemas.openxmlformats.org/officeDocument/2006/math" xmlns:a14="http://schemas.microsoft.com/office/drawing/2010/main" xmlns:ma14="http://schemas.microsoft.com/office/mac/drawingml/2011/main" val="1"/>
+              <ma14:wrappingTextBoxFlag xmlns:ma14="http://schemas.microsoft.com/office/mac/drawingml/2011/main" xmlns:a14="http://schemas.microsoft.com/office/drawing/2010/main" xmlns:m="http://schemas.openxmlformats.org/officeDocument/2006/math" xmlns="" val="1"/>
             </a:ext>
           </a:extLst>
         </p:spPr>
@@ -3944,7 +3944,7 @@
           </a:ln>
           <a:extLst>
             <a:ext uri="{C572A759-6A51-4108-AA02-DFA0A04FC94B}">
-              <ma14:wrappingTextBoxFlag xmlns="" xmlns:m="http://schemas.openxmlformats.org/officeDocument/2006/math" xmlns:a14="http://schemas.microsoft.com/office/drawing/2010/main" xmlns:ma14="http://schemas.microsoft.com/office/mac/drawingml/2011/main" val="1"/>
+              <ma14:wrappingTextBoxFlag xmlns:ma14="http://schemas.microsoft.com/office/mac/drawingml/2011/main" xmlns:a14="http://schemas.microsoft.com/office/drawing/2010/main" xmlns:m="http://schemas.openxmlformats.org/officeDocument/2006/math" xmlns="" val="1"/>
             </a:ext>
           </a:extLst>
         </p:spPr>
@@ -3982,13 +3982,7 @@
               <a:rPr lang="en-US" sz="3200" dirty="0">
                 <a:sym typeface="Arial Narrow"/>
               </a:rPr>
-              <a:t>the </a:t>
-            </a:r>
-            <a:r>
-              <a:rPr lang="en-US" sz="3200" dirty="0">
-                <a:sym typeface="Arial Narrow"/>
-              </a:rPr>
-              <a:t>numerical indicator of the learning rate (based on calculating the similarity of the proposed keyboard with the default)</a:t>
+              <a:t>the numerical indicator of the learning rate (based on calculating the similarity of the proposed keyboard with the default)</a:t>
             </a:r>
           </a:p>
         </p:txBody>
@@ -4036,7 +4030,7 @@
           </a:ln>
           <a:extLst>
             <a:ext uri="{C572A759-6A51-4108-AA02-DFA0A04FC94B}">
-              <ma14:wrappingTextBoxFlag xmlns="" xmlns:m="http://schemas.openxmlformats.org/officeDocument/2006/math" xmlns:a14="http://schemas.microsoft.com/office/drawing/2010/main" xmlns:ma14="http://schemas.microsoft.com/office/mac/drawingml/2011/main" val="1"/>
+              <ma14:wrappingTextBoxFlag xmlns:ma14="http://schemas.microsoft.com/office/mac/drawingml/2011/main" xmlns:a14="http://schemas.microsoft.com/office/drawing/2010/main" xmlns:m="http://schemas.openxmlformats.org/officeDocument/2006/math" xmlns="" val="1"/>
             </a:ext>
           </a:extLst>
         </p:spPr>
@@ -4229,7 +4223,7 @@
           </a:ln>
           <a:extLst>
             <a:ext uri="{C572A759-6A51-4108-AA02-DFA0A04FC94B}">
-              <ma14:wrappingTextBoxFlag xmlns="" xmlns:m="http://schemas.openxmlformats.org/officeDocument/2006/math" xmlns:a14="http://schemas.microsoft.com/office/drawing/2010/main" xmlns:ma14="http://schemas.microsoft.com/office/mac/drawingml/2011/main" val="1"/>
+              <ma14:wrappingTextBoxFlag xmlns:ma14="http://schemas.microsoft.com/office/mac/drawingml/2011/main" xmlns:a14="http://schemas.microsoft.com/office/drawing/2010/main" xmlns:m="http://schemas.openxmlformats.org/officeDocument/2006/math" xmlns="" val="1"/>
             </a:ext>
           </a:extLst>
         </p:spPr>
@@ -4307,7 +4301,7 @@
           </a:ln>
           <a:extLst>
             <a:ext uri="{C572A759-6A51-4108-AA02-DFA0A04FC94B}">
-              <ma14:wrappingTextBoxFlag xmlns="" xmlns:m="http://schemas.openxmlformats.org/officeDocument/2006/math" xmlns:a14="http://schemas.microsoft.com/office/drawing/2010/main" xmlns:ma14="http://schemas.microsoft.com/office/mac/drawingml/2011/main" val="1"/>
+              <ma14:wrappingTextBoxFlag xmlns:ma14="http://schemas.microsoft.com/office/mac/drawingml/2011/main" xmlns:a14="http://schemas.microsoft.com/office/drawing/2010/main" xmlns:m="http://schemas.openxmlformats.org/officeDocument/2006/math" xmlns="" val="1"/>
             </a:ext>
           </a:extLst>
         </p:spPr>
@@ -4418,7 +4412,7 @@
           </a:ln>
           <a:extLst>
             <a:ext uri="{C572A759-6A51-4108-AA02-DFA0A04FC94B}">
-              <ma14:wrappingTextBoxFlag xmlns="" xmlns:m="http://schemas.openxmlformats.org/officeDocument/2006/math" xmlns:a14="http://schemas.microsoft.com/office/drawing/2010/main" xmlns:ma14="http://schemas.microsoft.com/office/mac/drawingml/2011/main" val="1"/>
+              <ma14:wrappingTextBoxFlag xmlns:ma14="http://schemas.microsoft.com/office/mac/drawingml/2011/main" xmlns:a14="http://schemas.microsoft.com/office/drawing/2010/main" xmlns:m="http://schemas.openxmlformats.org/officeDocument/2006/math" xmlns="" val="1"/>
             </a:ext>
           </a:extLst>
         </p:spPr>
@@ -4496,7 +4490,7 @@
           </a:ln>
           <a:extLst>
             <a:ext uri="{C572A759-6A51-4108-AA02-DFA0A04FC94B}">
-              <ma14:wrappingTextBoxFlag xmlns="" xmlns:m="http://schemas.openxmlformats.org/officeDocument/2006/math" xmlns:a14="http://schemas.microsoft.com/office/drawing/2010/main" xmlns:ma14="http://schemas.microsoft.com/office/mac/drawingml/2011/main" val="1"/>
+              <ma14:wrappingTextBoxFlag xmlns:ma14="http://schemas.microsoft.com/office/mac/drawingml/2011/main" xmlns:a14="http://schemas.microsoft.com/office/drawing/2010/main" xmlns:m="http://schemas.openxmlformats.org/officeDocument/2006/math" xmlns="" val="1"/>
             </a:ext>
           </a:extLst>
         </p:spPr>
@@ -4571,7 +4565,7 @@
         </p:blipFill>
         <p:spPr>
           <a:xfrm>
-            <a:off x="780681" y="5286013"/>
+            <a:off x="670720" y="5286013"/>
             <a:ext cx="10187183" cy="6214364"/>
           </a:xfrm>
           <a:prstGeom prst="rect">
@@ -4595,7 +4589,7 @@
         </p:blipFill>
         <p:spPr>
           <a:xfrm>
-            <a:off x="12480032" y="5607766"/>
+            <a:off x="12336016" y="5607766"/>
             <a:ext cx="11567323" cy="5814701"/>
           </a:xfrm>
           <a:prstGeom prst="rect">
@@ -4655,7 +4649,7 @@
           </a:ln>
           <a:extLst>
             <a:ext uri="{C572A759-6A51-4108-AA02-DFA0A04FC94B}">
-              <ma14:wrappingTextBoxFlag xmlns="" xmlns:m="http://schemas.openxmlformats.org/officeDocument/2006/math" xmlns:a14="http://schemas.microsoft.com/office/drawing/2010/main" xmlns:ma14="http://schemas.microsoft.com/office/mac/drawingml/2011/main" val="1"/>
+              <ma14:wrappingTextBoxFlag xmlns:ma14="http://schemas.microsoft.com/office/mac/drawingml/2011/main" xmlns:a14="http://schemas.microsoft.com/office/drawing/2010/main" xmlns:m="http://schemas.openxmlformats.org/officeDocument/2006/math" xmlns="" val="1"/>
             </a:ext>
           </a:extLst>
         </p:spPr>
@@ -4701,7 +4695,7 @@
           </a:ln>
           <a:extLst>
             <a:ext uri="{C572A759-6A51-4108-AA02-DFA0A04FC94B}">
-              <ma14:wrappingTextBoxFlag xmlns="" xmlns:m="http://schemas.openxmlformats.org/officeDocument/2006/math" xmlns:a14="http://schemas.microsoft.com/office/drawing/2010/main" xmlns:ma14="http://schemas.microsoft.com/office/mac/drawingml/2011/main" val="1"/>
+              <ma14:wrappingTextBoxFlag xmlns:ma14="http://schemas.microsoft.com/office/mac/drawingml/2011/main" xmlns:a14="http://schemas.microsoft.com/office/drawing/2010/main" xmlns:m="http://schemas.openxmlformats.org/officeDocument/2006/math" xmlns="" val="1"/>
             </a:ext>
           </a:extLst>
         </p:spPr>
@@ -4723,7 +4717,15 @@
           <a:p>
             <a:r>
               <a:rPr lang="en-US" dirty="0" smtClean="0"/>
-              <a:t>Keyboard_prefix_10 is the best layout which generate algorithm</a:t>
+              <a:t>Keyboard_prefix_10 is the best layout </a:t>
+            </a:r>
+            <a:r>
+              <a:rPr lang="en-US" dirty="0" smtClean="0"/>
+              <a:t>which was generated by </a:t>
+            </a:r>
+            <a:r>
+              <a:rPr lang="en-US" dirty="0" smtClean="0"/>
+              <a:t>algorithm</a:t>
             </a:r>
             <a:endParaRPr dirty="0"/>
           </a:p>
@@ -4780,7 +4782,7 @@
           </a:ln>
           <a:extLst>
             <a:ext uri="{C572A759-6A51-4108-AA02-DFA0A04FC94B}">
-              <ma14:wrappingTextBoxFlag xmlns="" xmlns:m="http://schemas.openxmlformats.org/officeDocument/2006/math" xmlns:a14="http://schemas.microsoft.com/office/drawing/2010/main" xmlns:ma14="http://schemas.microsoft.com/office/mac/drawingml/2011/main" val="1"/>
+              <ma14:wrappingTextBoxFlag xmlns:ma14="http://schemas.microsoft.com/office/mac/drawingml/2011/main" xmlns:a14="http://schemas.microsoft.com/office/drawing/2010/main" xmlns:m="http://schemas.openxmlformats.org/officeDocument/2006/math" xmlns="" val="1"/>
             </a:ext>
           </a:extLst>
         </p:spPr>

</xml_diff>